<commit_message>
Deleting an employee now makes any of the employee's positions as vacant.
</commit_message>
<xml_diff>
--- a/StaffSchedulerPPP.pptx
+++ b/StaffSchedulerPPP.pptx
@@ -6,14 +6,13 @@
     <p:sldMasterId id="2147483660" r:id="rId5"/>
   </p:sldMasterIdLst>
   <p:notesMasterIdLst>
-    <p:notesMasterId r:id="rId11"/>
+    <p:notesMasterId r:id="rId10"/>
   </p:notesMasterIdLst>
   <p:sldIdLst>
     <p:sldId id="273" r:id="rId6"/>
     <p:sldId id="1066" r:id="rId7"/>
     <p:sldId id="259" r:id="rId8"/>
     <p:sldId id="1065" r:id="rId9"/>
-    <p:sldId id="1064" r:id="rId10"/>
   </p:sldIdLst>
   <p:sldSz cx="12192000" cy="6858000"/>
   <p:notesSz cx="6858000" cy="9144000"/>
@@ -745,102 +744,6 @@
 </p:notes>
 </file>
 
-<file path=ppt/notesSlides/notesSlide4.xml><?xml version="1.0" encoding="utf-8"?>
-<p:notes xmlns:a="http://schemas.openxmlformats.org/drawingml/2006/main" xmlns:r="http://schemas.openxmlformats.org/officeDocument/2006/relationships" xmlns:p="http://schemas.openxmlformats.org/presentationml/2006/main">
-  <p:cSld>
-    <p:spTree>
-      <p:nvGrpSpPr>
-        <p:cNvPr id="1" name=""/>
-        <p:cNvGrpSpPr/>
-        <p:nvPr/>
-      </p:nvGrpSpPr>
-      <p:grpSpPr>
-        <a:xfrm>
-          <a:off x="0" y="0"/>
-          <a:ext cx="0" cy="0"/>
-          <a:chOff x="0" y="0"/>
-          <a:chExt cx="0" cy="0"/>
-        </a:xfrm>
-      </p:grpSpPr>
-      <p:sp>
-        <p:nvSpPr>
-          <p:cNvPr id="2" name="Slide Image Placeholder 1"/>
-          <p:cNvSpPr>
-            <a:spLocks noGrp="1" noRot="1" noChangeAspect="1"/>
-          </p:cNvSpPr>
-          <p:nvPr>
-            <p:ph type="sldImg"/>
-          </p:nvPr>
-        </p:nvSpPr>
-        <p:spPr/>
-      </p:sp>
-      <p:sp>
-        <p:nvSpPr>
-          <p:cNvPr id="3" name="Notes Placeholder 2"/>
-          <p:cNvSpPr>
-            <a:spLocks noGrp="1"/>
-          </p:cNvSpPr>
-          <p:nvPr>
-            <p:ph type="body" idx="1"/>
-          </p:nvPr>
-        </p:nvSpPr>
-        <p:spPr/>
-        <p:txBody>
-          <a:bodyPr/>
-          <a:lstStyle/>
-          <a:p>
-            <a:pPr marL="0" indent="0">
-              <a:lnSpc>
-                <a:spcPct val="100000"/>
-              </a:lnSpc>
-              <a:spcBef>
-                <a:spcPts val="0"/>
-              </a:spcBef>
-              <a:spcAft>
-                <a:spcPts val="600"/>
-              </a:spcAft>
-              <a:buNone/>
-            </a:pPr>
-            <a:endParaRPr lang="en-US" sz="1200" dirty="0"/>
-          </a:p>
-        </p:txBody>
-      </p:sp>
-      <p:sp>
-        <p:nvSpPr>
-          <p:cNvPr id="4" name="Slide Number Placeholder 3"/>
-          <p:cNvSpPr>
-            <a:spLocks noGrp="1"/>
-          </p:cNvSpPr>
-          <p:nvPr>
-            <p:ph type="sldNum" sz="quarter" idx="5"/>
-          </p:nvPr>
-        </p:nvSpPr>
-        <p:spPr/>
-        <p:txBody>
-          <a:bodyPr/>
-          <a:lstStyle/>
-          <a:p>
-            <a:fld id="{A31FDC51-B781-4D52-9137-611BFCAB3618}" type="slidenum">
-              <a:rPr lang="en-US" smtClean="0"/>
-              <a:t>5</a:t>
-            </a:fld>
-            <a:endParaRPr lang="en-US"/>
-          </a:p>
-        </p:txBody>
-      </p:sp>
-    </p:spTree>
-    <p:extLst>
-      <p:ext uri="{BB962C8B-B14F-4D97-AF65-F5344CB8AC3E}">
-        <p14:creationId xmlns:p14="http://schemas.microsoft.com/office/powerpoint/2010/main" val="518361209"/>
-      </p:ext>
-    </p:extLst>
-  </p:cSld>
-  <p:clrMapOvr>
-    <a:masterClrMapping/>
-  </p:clrMapOvr>
-</p:notes>
-</file>
-
 <file path=ppt/slideLayouts/slideLayout1.xml><?xml version="1.0" encoding="utf-8"?>
 <p:sldLayout xmlns:a="http://schemas.openxmlformats.org/drawingml/2006/main" xmlns:r="http://schemas.openxmlformats.org/officeDocument/2006/relationships" xmlns:p="http://schemas.openxmlformats.org/presentationml/2006/main" type="title" preserve="1">
   <p:cSld name="Title Slide">
@@ -1516,7 +1419,7 @@
           <a:graphicData uri="http://schemas.openxmlformats.org/presentationml/2006/ole">
             <mc:AlternateContent xmlns:mc="http://schemas.openxmlformats.org/markup-compatibility/2006">
               <mc:Choice xmlns:v="urn:schemas-microsoft-com:vml" Requires="v">
-                <p:oleObj spid="_x0000_s2056" name="Diapositiva de think-cell" r:id="rId4" imgW="7772400" imgH="10058400" progId="TCLayout.ActiveDocument.1">
+                <p:oleObj spid="_x0000_s2057" name="Diapositiva de think-cell" r:id="rId4" imgW="7772400" imgH="10058400" progId="TCLayout.ActiveDocument.1">
                   <p:embed/>
                 </p:oleObj>
               </mc:Choice>
@@ -1805,7 +1708,7 @@
           <a:graphicData uri="http://schemas.openxmlformats.org/presentationml/2006/ole">
             <mc:AlternateContent xmlns:mc="http://schemas.openxmlformats.org/markup-compatibility/2006">
               <mc:Choice xmlns:v="urn:schemas-microsoft-com:vml" Requires="v">
-                <p:oleObj spid="_x0000_s3080" name="Diapositiva de think-cell" r:id="rId4" imgW="7772400" imgH="10058400" progId="TCLayout.ActiveDocument.1">
+                <p:oleObj spid="_x0000_s3081" name="Diapositiva de think-cell" r:id="rId4" imgW="7772400" imgH="10058400" progId="TCLayout.ActiveDocument.1">
                   <p:embed/>
                 </p:oleObj>
               </mc:Choice>
@@ -2095,7 +1998,7 @@
           <a:graphicData uri="http://schemas.openxmlformats.org/presentationml/2006/ole">
             <mc:AlternateContent xmlns:mc="http://schemas.openxmlformats.org/markup-compatibility/2006">
               <mc:Choice xmlns:v="urn:schemas-microsoft-com:vml" Requires="v">
-                <p:oleObj spid="_x0000_s4104" name="Diapositiva de think-cell" r:id="rId4" imgW="7772400" imgH="10058400" progId="TCLayout.ActiveDocument.1">
+                <p:oleObj spid="_x0000_s4105" name="Diapositiva de think-cell" r:id="rId4" imgW="7772400" imgH="10058400" progId="TCLayout.ActiveDocument.1">
                   <p:embed/>
                 </p:oleObj>
               </mc:Choice>
@@ -2316,7 +2219,7 @@
           <a:graphicData uri="http://schemas.openxmlformats.org/presentationml/2006/ole">
             <mc:AlternateContent xmlns:mc="http://schemas.openxmlformats.org/markup-compatibility/2006">
               <mc:Choice xmlns:v="urn:schemas-microsoft-com:vml" Requires="v">
-                <p:oleObj spid="_x0000_s5128" name="Diapositiva de think-cell" r:id="rId4" imgW="7772400" imgH="10058400" progId="TCLayout.ActiveDocument.1">
+                <p:oleObj spid="_x0000_s5129" name="Diapositiva de think-cell" r:id="rId4" imgW="7772400" imgH="10058400" progId="TCLayout.ActiveDocument.1">
                   <p:embed/>
                 </p:oleObj>
               </mc:Choice>
@@ -2690,7 +2593,7 @@
           <a:graphicData uri="http://schemas.openxmlformats.org/presentationml/2006/ole">
             <mc:AlternateContent xmlns:mc="http://schemas.openxmlformats.org/markup-compatibility/2006">
               <mc:Choice xmlns:v="urn:schemas-microsoft-com:vml" Requires="v">
-                <p:oleObj spid="_x0000_s6152" name="Diapositiva de think-cell" r:id="rId4" imgW="7772400" imgH="10058400" progId="TCLayout.ActiveDocument.1">
+                <p:oleObj spid="_x0000_s6153" name="Diapositiva de think-cell" r:id="rId4" imgW="7772400" imgH="10058400" progId="TCLayout.ActiveDocument.1">
                   <p:embed/>
                 </p:oleObj>
               </mc:Choice>
@@ -2906,7 +2809,7 @@
           <a:graphicData uri="http://schemas.openxmlformats.org/presentationml/2006/ole">
             <mc:AlternateContent xmlns:mc="http://schemas.openxmlformats.org/markup-compatibility/2006">
               <mc:Choice xmlns:v="urn:schemas-microsoft-com:vml" Requires="v">
-                <p:oleObj spid="_x0000_s7176" name="Diapositiva de think-cell" r:id="rId4" imgW="7772400" imgH="10058400" progId="TCLayout.ActiveDocument.1">
+                <p:oleObj spid="_x0000_s7177" name="Diapositiva de think-cell" r:id="rId4" imgW="7772400" imgH="10058400" progId="TCLayout.ActiveDocument.1">
                   <p:embed/>
                 </p:oleObj>
               </mc:Choice>
@@ -3083,7 +2986,7 @@
           <a:graphicData uri="http://schemas.openxmlformats.org/presentationml/2006/ole">
             <mc:AlternateContent xmlns:mc="http://schemas.openxmlformats.org/markup-compatibility/2006">
               <mc:Choice xmlns:v="urn:schemas-microsoft-com:vml" Requires="v">
-                <p:oleObj spid="_x0000_s8200" name="Diapositiva de think-cell" r:id="rId4" imgW="7772400" imgH="10058400" progId="TCLayout.ActiveDocument.1">
+                <p:oleObj spid="_x0000_s8201" name="Diapositiva de think-cell" r:id="rId4" imgW="7772400" imgH="10058400" progId="TCLayout.ActiveDocument.1">
                   <p:embed/>
                 </p:oleObj>
               </mc:Choice>
@@ -3444,7 +3347,7 @@
           <a:graphicData uri="http://schemas.openxmlformats.org/presentationml/2006/ole">
             <mc:AlternateContent xmlns:mc="http://schemas.openxmlformats.org/markup-compatibility/2006">
               <mc:Choice xmlns:v="urn:schemas-microsoft-com:vml" Requires="v">
-                <p:oleObj spid="_x0000_s9224" name="Diapositiva de think-cell" r:id="rId4" imgW="7772400" imgH="10058400" progId="TCLayout.ActiveDocument.1">
+                <p:oleObj spid="_x0000_s9225" name="Diapositiva de think-cell" r:id="rId4" imgW="7772400" imgH="10058400" progId="TCLayout.ActiveDocument.1">
                   <p:embed/>
                 </p:oleObj>
               </mc:Choice>
@@ -6502,7 +6405,7 @@
           <a:graphicData uri="http://schemas.openxmlformats.org/presentationml/2006/ole">
             <mc:AlternateContent xmlns:mc="http://schemas.openxmlformats.org/markup-compatibility/2006">
               <mc:Choice xmlns:v="urn:schemas-microsoft-com:vml" Requires="v">
-                <p:oleObj spid="_x0000_s1032" name="Diapositiva de think-cell" r:id="rId13" imgW="7772400" imgH="10058400" progId="TCLayout.ActiveDocument.1">
+                <p:oleObj spid="_x0000_s1033" name="Diapositiva de think-cell" r:id="rId13" imgW="7772400" imgH="10058400" progId="TCLayout.ActiveDocument.1">
                   <p:embed/>
                 </p:oleObj>
               </mc:Choice>
@@ -8324,135 +8227,6 @@
     <p:extLst>
       <p:ext uri="{BB962C8B-B14F-4D97-AF65-F5344CB8AC3E}">
         <p14:creationId xmlns:p14="http://schemas.microsoft.com/office/powerpoint/2010/main" val="4109836168"/>
-      </p:ext>
-    </p:extLst>
-  </p:cSld>
-  <p:clrMapOvr>
-    <a:masterClrMapping/>
-  </p:clrMapOvr>
-</p:sld>
-</file>
-
-<file path=ppt/slides/slide5.xml><?xml version="1.0" encoding="utf-8"?>
-<p:sld xmlns:a="http://schemas.openxmlformats.org/drawingml/2006/main" xmlns:r="http://schemas.openxmlformats.org/officeDocument/2006/relationships" xmlns:p="http://schemas.openxmlformats.org/presentationml/2006/main">
-  <p:cSld>
-    <p:spTree>
-      <p:nvGrpSpPr>
-        <p:cNvPr id="1" name=""/>
-        <p:cNvGrpSpPr/>
-        <p:nvPr/>
-      </p:nvGrpSpPr>
-      <p:grpSpPr>
-        <a:xfrm>
-          <a:off x="0" y="0"/>
-          <a:ext cx="0" cy="0"/>
-          <a:chOff x="0" y="0"/>
-          <a:chExt cx="0" cy="0"/>
-        </a:xfrm>
-      </p:grpSpPr>
-      <p:pic>
-        <p:nvPicPr>
-          <p:cNvPr id="19" name="Picture 18" descr="A picture containing background pattern&#10;&#10;Description automatically generated">
-            <a:extLst>
-              <a:ext uri="{FF2B5EF4-FFF2-40B4-BE49-F238E27FC236}">
-                <a16:creationId xmlns:a16="http://schemas.microsoft.com/office/drawing/2014/main" id="{EE770ECC-0AE1-4BA5-B0D2-47F7A453A733}"/>
-              </a:ext>
-            </a:extLst>
-          </p:cNvPr>
-          <p:cNvPicPr>
-            <a:picLocks noChangeAspect="1"/>
-          </p:cNvPicPr>
-          <p:nvPr/>
-        </p:nvPicPr>
-        <p:blipFill rotWithShape="1">
-          <a:blip r:embed="rId3" cstate="print">
-            <a:extLst>
-              <a:ext uri="{28A0092B-C50C-407E-A947-70E740481C1C}">
-                <a14:useLocalDpi xmlns:a14="http://schemas.microsoft.com/office/drawing/2010/main"/>
-              </a:ext>
-            </a:extLst>
-          </a:blip>
-          <a:srcRect/>
-          <a:stretch/>
-        </p:blipFill>
-        <p:spPr>
-          <a:xfrm>
-            <a:off x="1185" y="0"/>
-            <a:ext cx="12190815" cy="6858000"/>
-          </a:xfrm>
-          <a:prstGeom prst="rect">
-            <a:avLst/>
-          </a:prstGeom>
-        </p:spPr>
-      </p:pic>
-      <p:sp>
-        <p:nvSpPr>
-          <p:cNvPr id="11" name="Date Placeholder 10">
-            <a:extLst>
-              <a:ext uri="{FF2B5EF4-FFF2-40B4-BE49-F238E27FC236}">
-                <a16:creationId xmlns:a16="http://schemas.microsoft.com/office/drawing/2014/main" id="{1818131C-41EE-45E8-8349-E6DA66B13917}"/>
-              </a:ext>
-            </a:extLst>
-          </p:cNvPr>
-          <p:cNvSpPr>
-            <a:spLocks noGrp="1"/>
-          </p:cNvSpPr>
-          <p:nvPr>
-            <p:ph type="dt" sz="half" idx="10"/>
-          </p:nvPr>
-        </p:nvSpPr>
-        <p:spPr/>
-        <p:txBody>
-          <a:bodyPr/>
-          <a:lstStyle/>
-          <a:p>
-            <a:r>
-              <a:rPr lang="en-US" dirty="0"/>
-              <a:t>talentpath.com</a:t>
-            </a:r>
-          </a:p>
-        </p:txBody>
-      </p:sp>
-      <p:pic>
-        <p:nvPicPr>
-          <p:cNvPr id="20" name="Picture 19" descr="A drawing of a face&#10;&#10;Description automatically generated">
-            <a:extLst>
-              <a:ext uri="{FF2B5EF4-FFF2-40B4-BE49-F238E27FC236}">
-                <a16:creationId xmlns:a16="http://schemas.microsoft.com/office/drawing/2014/main" id="{2D32F7D8-2F00-4F0C-AB09-AC1FD43AFF54}"/>
-              </a:ext>
-            </a:extLst>
-          </p:cNvPr>
-          <p:cNvPicPr>
-            <a:picLocks noChangeAspect="1"/>
-          </p:cNvPicPr>
-          <p:nvPr/>
-        </p:nvPicPr>
-        <p:blipFill>
-          <a:blip r:embed="rId4" cstate="screen">
-            <a:extLst>
-              <a:ext uri="{28A0092B-C50C-407E-A947-70E740481C1C}">
-                <a14:useLocalDpi xmlns:a14="http://schemas.microsoft.com/office/drawing/2010/main"/>
-              </a:ext>
-            </a:extLst>
-          </a:blip>
-          <a:stretch>
-            <a:fillRect/>
-          </a:stretch>
-        </p:blipFill>
-        <p:spPr>
-          <a:xfrm>
-            <a:off x="10058399" y="685433"/>
-            <a:ext cx="1554297" cy="365315"/>
-          </a:xfrm>
-          <a:prstGeom prst="rect">
-            <a:avLst/>
-          </a:prstGeom>
-        </p:spPr>
-      </p:pic>
-    </p:spTree>
-    <p:extLst>
-      <p:ext uri="{BB962C8B-B14F-4D97-AF65-F5344CB8AC3E}">
-        <p14:creationId xmlns:p14="http://schemas.microsoft.com/office/powerpoint/2010/main" val="1499364601"/>
       </p:ext>
     </p:extLst>
   </p:cSld>

</xml_diff>